<commit_message>
Modified description of HandlerExceptionResolverLoggingInterceptor and related description error. #2794
</commit_message>
<xml_diff>
--- a/source/ArchitectureInDetail/WebApplicationDetail/images_ExceptionHandling/materialExceptionHandling.pptx
+++ b/source/ArchitectureInDetail/WebApplicationDetail/images_ExceptionHandling/materialExceptionHandling.pptx
@@ -154,7 +154,7 @@
       </p14:sectionLst>
     </p:ext>
     <p:ext uri="{EFAFB233-063F-42B5-8137-9DF3F51BA10A}">
-      <p15:sldGuideLst xmlns:p15="http://schemas.microsoft.com/office/powerpoint/2012/main">
+      <p15:sldGuideLst xmlns:p15="http://schemas.microsoft.com/office/powerpoint/2012/main" xmlns="">
         <p15:guide id="1" orient="horz" pos="2160">
           <p15:clr>
             <a:srgbClr val="A4A3A4"/>
@@ -254,7 +254,7 @@
             <a:fld id="{3BB47352-BF5A-4CD2-B029-996118CD8E01}" type="datetimeFigureOut">
               <a:rPr kumimoji="1" lang="ja-JP" altLang="en-US" smtClean="0"/>
               <a:pPr/>
-              <a:t>2017/3/2</a:t>
+              <a:t>2017/6/16</a:t>
             </a:fld>
             <a:endParaRPr kumimoji="1" lang="ja-JP" altLang="en-US" dirty="0"/>
           </a:p>
@@ -1502,7 +1502,7 @@
             <a:fld id="{7B9B12EC-6AA0-374B-A2D3-850081A07A26}" type="datetimeFigureOut">
               <a:rPr kumimoji="1" lang="ja-JP" altLang="en-US" smtClean="0"/>
               <a:pPr/>
-              <a:t>2017/3/2</a:t>
+              <a:t>2017/6/16</a:t>
             </a:fld>
             <a:endParaRPr kumimoji="1" lang="ja-JP" altLang="en-US" dirty="0"/>
           </a:p>
@@ -1706,7 +1706,7 @@
             <a:fld id="{7B9B12EC-6AA0-374B-A2D3-850081A07A26}" type="datetimeFigureOut">
               <a:rPr kumimoji="1" lang="ja-JP" altLang="en-US" smtClean="0"/>
               <a:pPr/>
-              <a:t>2017/3/2</a:t>
+              <a:t>2017/6/16</a:t>
             </a:fld>
             <a:endParaRPr kumimoji="1" lang="ja-JP" altLang="en-US" dirty="0"/>
           </a:p>
@@ -1920,7 +1920,7 @@
             <a:fld id="{7B9B12EC-6AA0-374B-A2D3-850081A07A26}" type="datetimeFigureOut">
               <a:rPr kumimoji="1" lang="ja-JP" altLang="en-US" smtClean="0"/>
               <a:pPr/>
-              <a:t>2017/3/2</a:t>
+              <a:t>2017/6/16</a:t>
             </a:fld>
             <a:endParaRPr kumimoji="1" lang="ja-JP" altLang="en-US" dirty="0"/>
           </a:p>
@@ -2124,7 +2124,7 @@
             <a:fld id="{7B9B12EC-6AA0-374B-A2D3-850081A07A26}" type="datetimeFigureOut">
               <a:rPr kumimoji="1" lang="ja-JP" altLang="en-US" smtClean="0"/>
               <a:pPr/>
-              <a:t>2017/3/2</a:t>
+              <a:t>2017/6/16</a:t>
             </a:fld>
             <a:endParaRPr kumimoji="1" lang="ja-JP" altLang="en-US" dirty="0"/>
           </a:p>
@@ -2372,7 +2372,7 @@
             <a:fld id="{7B9B12EC-6AA0-374B-A2D3-850081A07A26}" type="datetimeFigureOut">
               <a:rPr kumimoji="1" lang="ja-JP" altLang="en-US" smtClean="0"/>
               <a:pPr/>
-              <a:t>2017/3/2</a:t>
+              <a:t>2017/6/16</a:t>
             </a:fld>
             <a:endParaRPr kumimoji="1" lang="ja-JP" altLang="en-US" dirty="0"/>
           </a:p>
@@ -2726,7 +2726,7 @@
             <a:fld id="{7B9B12EC-6AA0-374B-A2D3-850081A07A26}" type="datetimeFigureOut">
               <a:rPr kumimoji="1" lang="ja-JP" altLang="en-US" smtClean="0"/>
               <a:pPr/>
-              <a:t>2017/3/2</a:t>
+              <a:t>2017/6/16</a:t>
             </a:fld>
             <a:endParaRPr kumimoji="1" lang="ja-JP" altLang="en-US" dirty="0"/>
           </a:p>
@@ -3214,7 +3214,7 @@
             <a:fld id="{7B9B12EC-6AA0-374B-A2D3-850081A07A26}" type="datetimeFigureOut">
               <a:rPr kumimoji="1" lang="ja-JP" altLang="en-US" smtClean="0"/>
               <a:pPr/>
-              <a:t>2017/3/2</a:t>
+              <a:t>2017/6/16</a:t>
             </a:fld>
             <a:endParaRPr kumimoji="1" lang="ja-JP" altLang="en-US" dirty="0"/>
           </a:p>
@@ -3334,7 +3334,7 @@
             <a:fld id="{7B9B12EC-6AA0-374B-A2D3-850081A07A26}" type="datetimeFigureOut">
               <a:rPr kumimoji="1" lang="ja-JP" altLang="en-US" smtClean="0"/>
               <a:pPr/>
-              <a:t>2017/3/2</a:t>
+              <a:t>2017/6/16</a:t>
             </a:fld>
             <a:endParaRPr kumimoji="1" lang="ja-JP" altLang="en-US" dirty="0"/>
           </a:p>
@@ -3431,7 +3431,7 @@
             <a:fld id="{7B9B12EC-6AA0-374B-A2D3-850081A07A26}" type="datetimeFigureOut">
               <a:rPr kumimoji="1" lang="ja-JP" altLang="en-US" smtClean="0"/>
               <a:pPr/>
-              <a:t>2017/3/2</a:t>
+              <a:t>2017/6/16</a:t>
             </a:fld>
             <a:endParaRPr kumimoji="1" lang="ja-JP" altLang="en-US" dirty="0"/>
           </a:p>
@@ -3742,7 +3742,7 @@
             <a:fld id="{7B9B12EC-6AA0-374B-A2D3-850081A07A26}" type="datetimeFigureOut">
               <a:rPr kumimoji="1" lang="ja-JP" altLang="en-US" smtClean="0"/>
               <a:pPr/>
-              <a:t>2017/3/2</a:t>
+              <a:t>2017/6/16</a:t>
             </a:fld>
             <a:endParaRPr kumimoji="1" lang="ja-JP" altLang="en-US" dirty="0"/>
           </a:p>
@@ -3997,7 +3997,7 @@
             <a:fld id="{7B9B12EC-6AA0-374B-A2D3-850081A07A26}" type="datetimeFigureOut">
               <a:rPr kumimoji="1" lang="ja-JP" altLang="en-US" smtClean="0"/>
               <a:pPr/>
-              <a:t>2017/3/2</a:t>
+              <a:t>2017/6/16</a:t>
             </a:fld>
             <a:endParaRPr kumimoji="1" lang="ja-JP" altLang="en-US" dirty="0"/>
           </a:p>
@@ -4244,7 +4244,7 @@
             <a:fld id="{7B9B12EC-6AA0-374B-A2D3-850081A07A26}" type="datetimeFigureOut">
               <a:rPr kumimoji="1" lang="ja-JP" altLang="en-US" smtClean="0"/>
               <a:pPr/>
-              <a:t>2017/3/2</a:t>
+              <a:t>2017/6/16</a:t>
             </a:fld>
             <a:endParaRPr kumimoji="1" lang="ja-JP" altLang="en-US" dirty="0"/>
           </a:p>
@@ -8520,15 +8520,7 @@
                   <a:schemeClr val="tx1"/>
                 </a:solidFill>
               </a:rPr>
-              <a:t>define </a:t>
-            </a:r>
-            <a:r>
-              <a:rPr lang="en-US" altLang="ja-JP" sz="1200" dirty="0" smtClean="0">
-                <a:solidFill>
-                  <a:schemeClr val="tx1"/>
-                </a:solidFill>
-              </a:rPr>
-              <a:t>bean &amp; AOP</a:t>
+              <a:t>define bean &amp; AOP</a:t>
             </a:r>
             <a:endParaRPr lang="ja-JP" altLang="en-US" sz="1200" dirty="0">
               <a:solidFill>
@@ -11319,15 +11311,7 @@
                   <a:schemeClr val="tx1"/>
                 </a:solidFill>
               </a:rPr>
-              <a:t>define </a:t>
-            </a:r>
-            <a:r>
-              <a:rPr lang="en-US" altLang="ja-JP" sz="1200" dirty="0" smtClean="0">
-                <a:solidFill>
-                  <a:schemeClr val="tx1"/>
-                </a:solidFill>
-              </a:rPr>
-              <a:t>bean &amp; AOP</a:t>
+              <a:t>define bean &amp; AOP</a:t>
             </a:r>
             <a:endParaRPr lang="ja-JP" altLang="en-US" sz="1200" dirty="0">
               <a:solidFill>
@@ -14350,7 +14334,7 @@
         </p:nvSpPr>
         <p:spPr>
           <a:xfrm>
-            <a:off x="4230006" y="494702"/>
+            <a:off x="4230006" y="329602"/>
             <a:ext cx="592096" cy="344590"/>
           </a:xfrm>
           <a:prstGeom prst="rightArrow">
@@ -14388,107 +14372,6 @@
               <a:t>error</a:t>
             </a:r>
             <a:endParaRPr kumimoji="1" lang="en-US" altLang="ja-JP" sz="1000" dirty="0" smtClean="0">
-              <a:solidFill>
-                <a:schemeClr val="tx1"/>
-              </a:solidFill>
-            </a:endParaRPr>
-          </a:p>
-        </p:txBody>
-      </p:sp>
-      <p:sp>
-        <p:nvSpPr>
-          <p:cNvPr id="80" name="右矢印 79"/>
-          <p:cNvSpPr/>
-          <p:nvPr/>
-        </p:nvSpPr>
-        <p:spPr>
-          <a:xfrm>
-            <a:off x="4230006" y="332063"/>
-            <a:ext cx="592096" cy="344590"/>
-          </a:xfrm>
-          <a:prstGeom prst="rightArrow">
-            <a:avLst/>
-          </a:prstGeom>
-          <a:solidFill>
-            <a:schemeClr val="bg1"/>
-          </a:solidFill>
-        </p:spPr>
-        <p:style>
-          <a:lnRef idx="1">
-            <a:schemeClr val="accent1"/>
-          </a:lnRef>
-          <a:fillRef idx="3">
-            <a:schemeClr val="accent1"/>
-          </a:fillRef>
-          <a:effectRef idx="2">
-            <a:schemeClr val="accent1"/>
-          </a:effectRef>
-          <a:fontRef idx="minor">
-            <a:schemeClr val="lt1"/>
-          </a:fontRef>
-        </p:style>
-        <p:txBody>
-          <a:bodyPr rtlCol="0" anchor="ctr"/>
-          <a:lstStyle/>
-          <a:p>
-            <a:pPr algn="ctr"/>
-            <a:r>
-              <a:rPr kumimoji="1" lang="en-US" altLang="ja-JP" sz="1000" dirty="0" smtClean="0">
-                <a:solidFill>
-                  <a:schemeClr val="tx1"/>
-                </a:solidFill>
-              </a:rPr>
-              <a:t>warn</a:t>
-            </a:r>
-          </a:p>
-        </p:txBody>
-      </p:sp>
-      <p:sp>
-        <p:nvSpPr>
-          <p:cNvPr id="81" name="右矢印 80"/>
-          <p:cNvSpPr/>
-          <p:nvPr/>
-        </p:nvSpPr>
-        <p:spPr>
-          <a:xfrm>
-            <a:off x="4230006" y="150112"/>
-            <a:ext cx="592096" cy="344590"/>
-          </a:xfrm>
-          <a:prstGeom prst="rightArrow">
-            <a:avLst/>
-          </a:prstGeom>
-          <a:solidFill>
-            <a:schemeClr val="bg1"/>
-          </a:solidFill>
-        </p:spPr>
-        <p:style>
-          <a:lnRef idx="1">
-            <a:schemeClr val="accent1"/>
-          </a:lnRef>
-          <a:fillRef idx="3">
-            <a:schemeClr val="accent1"/>
-          </a:fillRef>
-          <a:effectRef idx="2">
-            <a:schemeClr val="accent1"/>
-          </a:effectRef>
-          <a:fontRef idx="minor">
-            <a:schemeClr val="lt1"/>
-          </a:fontRef>
-        </p:style>
-        <p:txBody>
-          <a:bodyPr rtlCol="0" anchor="ctr"/>
-          <a:lstStyle/>
-          <a:p>
-            <a:pPr algn="ctr"/>
-            <a:r>
-              <a:rPr kumimoji="1" lang="en-US" altLang="ja-JP" sz="1000" dirty="0" smtClean="0">
-                <a:solidFill>
-                  <a:schemeClr val="tx1"/>
-                </a:solidFill>
-              </a:rPr>
-              <a:t>Info</a:t>
-            </a:r>
-            <a:endParaRPr lang="en-US" altLang="ja-JP" sz="1000" dirty="0">
               <a:solidFill>
                 <a:schemeClr val="tx1"/>
               </a:solidFill>
@@ -30735,15 +30618,7 @@
                   <a:schemeClr val="tx1"/>
                 </a:solidFill>
               </a:rPr>
-              <a:t>define </a:t>
-            </a:r>
-            <a:r>
-              <a:rPr lang="en-US" altLang="ja-JP" sz="1200" dirty="0" smtClean="0">
-                <a:solidFill>
-                  <a:schemeClr val="tx1"/>
-                </a:solidFill>
-              </a:rPr>
-              <a:t>bean &amp; AOP</a:t>
+              <a:t>define bean &amp; AOP</a:t>
             </a:r>
             <a:endParaRPr lang="ja-JP" altLang="en-US" sz="1200" dirty="0">
               <a:solidFill>

</xml_diff>